<commit_message>
Further update to sequence diagram
</commit_message>
<xml_diff>
--- a/docs/diagrams/HighLevelSequenceDiagrams.pptx
+++ b/docs/diagrams/HighLevelSequenceDiagrams.pptx
@@ -225,7 +225,7 @@
           <a:p>
             <a:fld id="{F5CC4B3F-88C1-4FFA-B1B6-F41C21DC6924}" type="datetimeFigureOut">
               <a:rPr lang="en-US" smtClean="0"/>
-              <a:t>11/9/2018</a:t>
+              <a:t>11/12/2018</a:t>
             </a:fld>
             <a:endParaRPr lang="en-US"/>
           </a:p>
@@ -671,7 +671,7 @@
           <a:p>
             <a:fld id="{78C97017-6FC3-485B-9764-EAC9E56C1D49}" type="datetimeFigureOut">
               <a:rPr lang="en-US" smtClean="0"/>
-              <a:t>11/9/2018</a:t>
+              <a:t>11/12/2018</a:t>
             </a:fld>
             <a:endParaRPr lang="en-US"/>
           </a:p>
@@ -839,7 +839,7 @@
           <a:p>
             <a:fld id="{78C97017-6FC3-485B-9764-EAC9E56C1D49}" type="datetimeFigureOut">
               <a:rPr lang="en-US" smtClean="0"/>
-              <a:t>11/9/2018</a:t>
+              <a:t>11/12/2018</a:t>
             </a:fld>
             <a:endParaRPr lang="en-US"/>
           </a:p>
@@ -1017,7 +1017,7 @@
           <a:p>
             <a:fld id="{78C97017-6FC3-485B-9764-EAC9E56C1D49}" type="datetimeFigureOut">
               <a:rPr lang="en-US" smtClean="0"/>
-              <a:t>11/9/2018</a:t>
+              <a:t>11/12/2018</a:t>
             </a:fld>
             <a:endParaRPr lang="en-US"/>
           </a:p>
@@ -1185,7 +1185,7 @@
           <a:p>
             <a:fld id="{78C97017-6FC3-485B-9764-EAC9E56C1D49}" type="datetimeFigureOut">
               <a:rPr lang="en-US" smtClean="0"/>
-              <a:t>11/9/2018</a:t>
+              <a:t>11/12/2018</a:t>
             </a:fld>
             <a:endParaRPr lang="en-US"/>
           </a:p>
@@ -1430,7 +1430,7 @@
           <a:p>
             <a:fld id="{78C97017-6FC3-485B-9764-EAC9E56C1D49}" type="datetimeFigureOut">
               <a:rPr lang="en-US" smtClean="0"/>
-              <a:t>11/9/2018</a:t>
+              <a:t>11/12/2018</a:t>
             </a:fld>
             <a:endParaRPr lang="en-US"/>
           </a:p>
@@ -1715,7 +1715,7 @@
           <a:p>
             <a:fld id="{78C97017-6FC3-485B-9764-EAC9E56C1D49}" type="datetimeFigureOut">
               <a:rPr lang="en-US" smtClean="0"/>
-              <a:t>11/9/2018</a:t>
+              <a:t>11/12/2018</a:t>
             </a:fld>
             <a:endParaRPr lang="en-US"/>
           </a:p>
@@ -2134,7 +2134,7 @@
           <a:p>
             <a:fld id="{78C97017-6FC3-485B-9764-EAC9E56C1D49}" type="datetimeFigureOut">
               <a:rPr lang="en-US" smtClean="0"/>
-              <a:t>11/9/2018</a:t>
+              <a:t>11/12/2018</a:t>
             </a:fld>
             <a:endParaRPr lang="en-US"/>
           </a:p>
@@ -2251,7 +2251,7 @@
           <a:p>
             <a:fld id="{78C97017-6FC3-485B-9764-EAC9E56C1D49}" type="datetimeFigureOut">
               <a:rPr lang="en-US" smtClean="0"/>
-              <a:t>11/9/2018</a:t>
+              <a:t>11/12/2018</a:t>
             </a:fld>
             <a:endParaRPr lang="en-US"/>
           </a:p>
@@ -2346,7 +2346,7 @@
           <a:p>
             <a:fld id="{78C97017-6FC3-485B-9764-EAC9E56C1D49}" type="datetimeFigureOut">
               <a:rPr lang="en-US" smtClean="0"/>
-              <a:t>11/9/2018</a:t>
+              <a:t>11/12/2018</a:t>
             </a:fld>
             <a:endParaRPr lang="en-US"/>
           </a:p>
@@ -2621,7 +2621,7 @@
           <a:p>
             <a:fld id="{78C97017-6FC3-485B-9764-EAC9E56C1D49}" type="datetimeFigureOut">
               <a:rPr lang="en-US" smtClean="0"/>
-              <a:t>11/9/2018</a:t>
+              <a:t>11/12/2018</a:t>
             </a:fld>
             <a:endParaRPr lang="en-US"/>
           </a:p>
@@ -2873,7 +2873,7 @@
           <a:p>
             <a:fld id="{78C97017-6FC3-485B-9764-EAC9E56C1D49}" type="datetimeFigureOut">
               <a:rPr lang="en-US" smtClean="0"/>
-              <a:t>11/9/2018</a:t>
+              <a:t>11/12/2018</a:t>
             </a:fld>
             <a:endParaRPr lang="en-US"/>
           </a:p>
@@ -3084,7 +3084,7 @@
           <a:p>
             <a:fld id="{78C97017-6FC3-485B-9764-EAC9E56C1D49}" type="datetimeFigureOut">
               <a:rPr lang="en-US" smtClean="0"/>
-              <a:t>11/9/2018</a:t>
+              <a:t>11/12/2018</a:t>
             </a:fld>
             <a:endParaRPr lang="en-US"/>
           </a:p>
@@ -11848,8 +11848,8 @@
         </p:nvSpPr>
         <p:spPr>
           <a:xfrm>
-            <a:off x="4361666" y="1878783"/>
-            <a:ext cx="106372" cy="1052114"/>
+            <a:off x="4361665" y="1878782"/>
+            <a:ext cx="137061" cy="1187963"/>
           </a:xfrm>
           <a:prstGeom prst="rect">
             <a:avLst/>
@@ -11953,7 +11953,7 @@
         </p:nvCxnSpPr>
         <p:spPr>
           <a:xfrm>
-            <a:off x="2998567" y="2896455"/>
+            <a:off x="2998567" y="3048000"/>
             <a:ext cx="1389996" cy="0"/>
           </a:xfrm>
           <a:prstGeom prst="straightConnector1">
@@ -12205,8 +12205,8 @@
         </p:nvSpPr>
         <p:spPr>
           <a:xfrm>
-            <a:off x="1146175" y="2458949"/>
-            <a:ext cx="166834" cy="3865648"/>
+            <a:off x="1142670" y="2434577"/>
+            <a:ext cx="149031" cy="513629"/>
           </a:xfrm>
           <a:prstGeom prst="rect">
             <a:avLst/>
@@ -12262,7 +12262,7 @@
         </p:nvCxnSpPr>
         <p:spPr>
           <a:xfrm flipH="1">
-            <a:off x="1313009" y="2732078"/>
+            <a:off x="1313008" y="2948206"/>
             <a:ext cx="3061842" cy="0"/>
           </a:xfrm>
           <a:prstGeom prst="straightConnector1">
@@ -12398,10 +12398,10 @@
         </p:nvGrpSpPr>
         <p:grpSpPr>
           <a:xfrm>
-            <a:off x="891322" y="2400509"/>
-            <a:ext cx="318328" cy="356515"/>
-            <a:chOff x="1028134" y="5612032"/>
-            <a:chExt cx="217349" cy="270072"/>
+            <a:off x="958971" y="2411549"/>
+            <a:ext cx="249764" cy="430888"/>
+            <a:chOff x="1072933" y="5504925"/>
+            <a:chExt cx="143421" cy="377179"/>
           </a:xfrm>
         </p:grpSpPr>
         <p:sp>
@@ -12418,8 +12418,8 @@
           </p:nvSpPr>
           <p:spPr>
             <a:xfrm rot="2600998" flipH="1" flipV="1">
-              <a:off x="1028134" y="5612032"/>
-              <a:ext cx="167452" cy="116880"/>
+              <a:off x="1072933" y="5504925"/>
+              <a:ext cx="106856" cy="155049"/>
             </a:xfrm>
             <a:custGeom>
               <a:avLst/>
@@ -12499,7 +12499,7 @@
             <a:lstStyle/>
             <a:p>
               <a:pPr algn="ctr"/>
-              <a:endParaRPr lang="en-SG"/>
+              <a:endParaRPr lang="en-SG" dirty="0"/>
             </a:p>
           </p:txBody>
         </p:sp>
@@ -12517,8 +12517,8 @@
           </p:nvSpPr>
           <p:spPr>
             <a:xfrm>
-              <a:off x="1147403" y="5712513"/>
-              <a:ext cx="98080" cy="169591"/>
+              <a:off x="1147404" y="5660838"/>
+              <a:ext cx="68950" cy="221266"/>
             </a:xfrm>
             <a:prstGeom prst="rect">
               <a:avLst/>
@@ -12552,7 +12552,7 @@
             <a:lstStyle/>
             <a:p>
               <a:pPr algn="ctr"/>
-              <a:endParaRPr lang="en-SG" sz="1400">
+              <a:endParaRPr lang="en-SG" sz="1400" dirty="0">
                 <a:solidFill>
                   <a:schemeClr val="dk1"/>
                 </a:solidFill>
@@ -12575,7 +12575,7 @@
         </p:nvSpPr>
         <p:spPr>
           <a:xfrm>
-            <a:off x="57893" y="2235502"/>
+            <a:off x="-76200" y="2235502"/>
             <a:ext cx="794081" cy="430887"/>
           </a:xfrm>
           <a:prstGeom prst="rect">
@@ -13048,12 +13048,714 @@
           </a:fontRef>
         </p:style>
       </p:cxnSp>
+      <p:sp>
+        <p:nvSpPr>
+          <p:cNvPr id="36" name="Rectangle 35">
+            <a:extLst>
+              <a:ext uri="{FF2B5EF4-FFF2-40B4-BE49-F238E27FC236}">
+                <a16:creationId xmlns:a16="http://schemas.microsoft.com/office/drawing/2014/main" id="{C6037FFC-F444-4533-BE7E-AEEDBB2A0E4F}"/>
+              </a:ext>
+            </a:extLst>
+          </p:cNvPr>
+          <p:cNvSpPr/>
+          <p:nvPr/>
+        </p:nvSpPr>
+        <p:spPr>
+          <a:xfrm>
+            <a:off x="1146870" y="3885401"/>
+            <a:ext cx="166137" cy="577185"/>
+          </a:xfrm>
+          <a:prstGeom prst="rect">
+            <a:avLst/>
+          </a:prstGeom>
+          <a:solidFill>
+            <a:srgbClr val="00B050"/>
+          </a:solidFill>
+          <a:ln>
+            <a:solidFill>
+              <a:schemeClr val="bg1"/>
+            </a:solidFill>
+          </a:ln>
+          <a:effectLst/>
+        </p:spPr>
+        <p:style>
+          <a:lnRef idx="1">
+            <a:schemeClr val="accent3"/>
+          </a:lnRef>
+          <a:fillRef idx="2">
+            <a:schemeClr val="accent3"/>
+          </a:fillRef>
+          <a:effectRef idx="1">
+            <a:schemeClr val="accent3"/>
+          </a:effectRef>
+          <a:fontRef idx="minor">
+            <a:schemeClr val="dk1"/>
+          </a:fontRef>
+        </p:style>
+        <p:txBody>
+          <a:bodyPr rtlCol="0" anchor="ctr"/>
+          <a:lstStyle/>
+          <a:p>
+            <a:pPr algn="ctr"/>
+            <a:endParaRPr lang="en-SG" sz="1400">
+              <a:solidFill>
+                <a:schemeClr val="dk1"/>
+              </a:solidFill>
+            </a:endParaRPr>
+          </a:p>
+        </p:txBody>
+      </p:sp>
+      <p:sp>
+        <p:nvSpPr>
+          <p:cNvPr id="37" name="Rectangle 36">
+            <a:extLst>
+              <a:ext uri="{FF2B5EF4-FFF2-40B4-BE49-F238E27FC236}">
+                <a16:creationId xmlns:a16="http://schemas.microsoft.com/office/drawing/2014/main" id="{8B8F83CC-2517-410B-8442-FE0FD2BE10AC}"/>
+              </a:ext>
+            </a:extLst>
+          </p:cNvPr>
+          <p:cNvSpPr/>
+          <p:nvPr/>
+        </p:nvSpPr>
+        <p:spPr>
+          <a:xfrm>
+            <a:off x="1316598" y="3937034"/>
+            <a:ext cx="2985689" cy="307777"/>
+          </a:xfrm>
+          <a:prstGeom prst="rect">
+            <a:avLst/>
+          </a:prstGeom>
+        </p:spPr>
+        <p:txBody>
+          <a:bodyPr wrap="none">
+            <a:spAutoFit/>
+          </a:bodyPr>
+          <a:lstStyle/>
+          <a:p>
+            <a:r>
+              <a:rPr lang="en-US" sz="1400" dirty="0" err="1">
+                <a:solidFill>
+                  <a:srgbClr val="00B050"/>
+                </a:solidFill>
+              </a:rPr>
+              <a:t>handleJumpToEntryListRequestEvent</a:t>
+            </a:r>
+            <a:r>
+              <a:rPr lang="en-US" sz="1400" dirty="0">
+                <a:solidFill>
+                  <a:srgbClr val="00B050"/>
+                </a:solidFill>
+              </a:rPr>
+              <a:t>()</a:t>
+            </a:r>
+            <a:endParaRPr lang="en-SG" sz="1400" dirty="0">
+              <a:solidFill>
+                <a:srgbClr val="00B050"/>
+              </a:solidFill>
+            </a:endParaRPr>
+          </a:p>
+        </p:txBody>
+      </p:sp>
+      <p:cxnSp>
+        <p:nvCxnSpPr>
+          <p:cNvPr id="39" name="Straight Arrow Connector 38">
+            <a:extLst>
+              <a:ext uri="{FF2B5EF4-FFF2-40B4-BE49-F238E27FC236}">
+                <a16:creationId xmlns:a16="http://schemas.microsoft.com/office/drawing/2014/main" id="{5FBCDF11-5279-4A51-AEB4-68D702874CB4}"/>
+              </a:ext>
+            </a:extLst>
+          </p:cNvPr>
+          <p:cNvCxnSpPr/>
+          <p:nvPr/>
+        </p:nvCxnSpPr>
+        <p:spPr>
+          <a:xfrm>
+            <a:off x="1313009" y="3927104"/>
+            <a:ext cx="3061841" cy="0"/>
+          </a:xfrm>
+          <a:prstGeom prst="straightConnector1">
+            <a:avLst/>
+          </a:prstGeom>
+          <a:ln w="19050">
+            <a:solidFill>
+              <a:schemeClr val="accent5">
+                <a:lumMod val="75000"/>
+              </a:schemeClr>
+            </a:solidFill>
+            <a:headEnd type="arrow" w="med" len="med"/>
+            <a:tailEnd type="none" w="med" len="med"/>
+          </a:ln>
+        </p:spPr>
+        <p:style>
+          <a:lnRef idx="1">
+            <a:schemeClr val="accent1"/>
+          </a:lnRef>
+          <a:fillRef idx="0">
+            <a:schemeClr val="accent1"/>
+          </a:fillRef>
+          <a:effectRef idx="0">
+            <a:schemeClr val="accent1"/>
+          </a:effectRef>
+          <a:fontRef idx="minor">
+            <a:schemeClr val="tx1"/>
+          </a:fontRef>
+        </p:style>
+      </p:cxnSp>
+      <p:cxnSp>
+        <p:nvCxnSpPr>
+          <p:cNvPr id="40" name="Straight Arrow Connector 39">
+            <a:extLst>
+              <a:ext uri="{FF2B5EF4-FFF2-40B4-BE49-F238E27FC236}">
+                <a16:creationId xmlns:a16="http://schemas.microsoft.com/office/drawing/2014/main" id="{745CA873-4836-460C-AEDD-811AD2FDBB5C}"/>
+              </a:ext>
+            </a:extLst>
+          </p:cNvPr>
+          <p:cNvCxnSpPr/>
+          <p:nvPr/>
+        </p:nvCxnSpPr>
+        <p:spPr>
+          <a:xfrm flipH="1">
+            <a:off x="1287607" y="4419600"/>
+            <a:ext cx="3061842" cy="0"/>
+          </a:xfrm>
+          <a:prstGeom prst="straightConnector1">
+            <a:avLst/>
+          </a:prstGeom>
+          <a:ln w="19050">
+            <a:solidFill>
+              <a:srgbClr val="00B050"/>
+            </a:solidFill>
+            <a:prstDash val="sysDash"/>
+            <a:headEnd type="arrow" w="med" len="med"/>
+            <a:tailEnd type="none" w="med" len="med"/>
+          </a:ln>
+        </p:spPr>
+        <p:style>
+          <a:lnRef idx="1">
+            <a:schemeClr val="accent1"/>
+          </a:lnRef>
+          <a:fillRef idx="0">
+            <a:schemeClr val="accent1"/>
+          </a:fillRef>
+          <a:effectRef idx="0">
+            <a:schemeClr val="accent1"/>
+          </a:effectRef>
+          <a:fontRef idx="minor">
+            <a:schemeClr val="tx1"/>
+          </a:fontRef>
+        </p:style>
+      </p:cxnSp>
+      <p:cxnSp>
+        <p:nvCxnSpPr>
+          <p:cNvPr id="41" name="Straight Arrow Connector 40">
+            <a:extLst>
+              <a:ext uri="{FF2B5EF4-FFF2-40B4-BE49-F238E27FC236}">
+                <a16:creationId xmlns:a16="http://schemas.microsoft.com/office/drawing/2014/main" id="{40B56870-0E82-40C5-A9A0-22069B184D96}"/>
+              </a:ext>
+            </a:extLst>
+          </p:cNvPr>
+          <p:cNvCxnSpPr>
+            <a:cxnSpLocks/>
+          </p:cNvCxnSpPr>
+          <p:nvPr/>
+        </p:nvCxnSpPr>
+        <p:spPr>
+          <a:xfrm>
+            <a:off x="3060575" y="4648200"/>
+            <a:ext cx="1327988" cy="0"/>
+          </a:xfrm>
+          <a:prstGeom prst="straightConnector1">
+            <a:avLst/>
+          </a:prstGeom>
+          <a:ln w="19050">
+            <a:solidFill>
+              <a:schemeClr val="accent5">
+                <a:lumMod val="75000"/>
+              </a:schemeClr>
+            </a:solidFill>
+            <a:prstDash val="sysDash"/>
+            <a:headEnd type="arrow" w="med" len="med"/>
+            <a:tailEnd type="none" w="med" len="med"/>
+          </a:ln>
+        </p:spPr>
+        <p:style>
+          <a:lnRef idx="1">
+            <a:schemeClr val="accent1"/>
+          </a:lnRef>
+          <a:fillRef idx="0">
+            <a:schemeClr val="accent1"/>
+          </a:fillRef>
+          <a:effectRef idx="0">
+            <a:schemeClr val="accent1"/>
+          </a:effectRef>
+          <a:fontRef idx="minor">
+            <a:schemeClr val="tx1"/>
+          </a:fontRef>
+        </p:style>
+      </p:cxnSp>
+      <p:cxnSp>
+        <p:nvCxnSpPr>
+          <p:cNvPr id="42" name="Straight Arrow Connector 41">
+            <a:extLst>
+              <a:ext uri="{FF2B5EF4-FFF2-40B4-BE49-F238E27FC236}">
+                <a16:creationId xmlns:a16="http://schemas.microsoft.com/office/drawing/2014/main" id="{E9F74C9C-1941-4E92-9EA9-F7D49C40551E}"/>
+              </a:ext>
+            </a:extLst>
+          </p:cNvPr>
+          <p:cNvCxnSpPr/>
+          <p:nvPr/>
+        </p:nvCxnSpPr>
+        <p:spPr>
+          <a:xfrm>
+            <a:off x="1240446" y="5410452"/>
+            <a:ext cx="3061841" cy="0"/>
+          </a:xfrm>
+          <a:prstGeom prst="straightConnector1">
+            <a:avLst/>
+          </a:prstGeom>
+          <a:ln w="19050">
+            <a:solidFill>
+              <a:schemeClr val="accent5">
+                <a:lumMod val="75000"/>
+              </a:schemeClr>
+            </a:solidFill>
+            <a:headEnd type="arrow" w="med" len="med"/>
+            <a:tailEnd type="none" w="med" len="med"/>
+          </a:ln>
+        </p:spPr>
+        <p:style>
+          <a:lnRef idx="1">
+            <a:schemeClr val="accent1"/>
+          </a:lnRef>
+          <a:fillRef idx="0">
+            <a:schemeClr val="accent1"/>
+          </a:fillRef>
+          <a:effectRef idx="0">
+            <a:schemeClr val="accent1"/>
+          </a:effectRef>
+          <a:fontRef idx="minor">
+            <a:schemeClr val="tx1"/>
+          </a:fontRef>
+        </p:style>
+      </p:cxnSp>
+      <p:sp>
+        <p:nvSpPr>
+          <p:cNvPr id="44" name="TextBox 43">
+            <a:extLst>
+              <a:ext uri="{FF2B5EF4-FFF2-40B4-BE49-F238E27FC236}">
+                <a16:creationId xmlns:a16="http://schemas.microsoft.com/office/drawing/2014/main" id="{6BC43812-C598-4B2B-855B-C59FD1B57057}"/>
+              </a:ext>
+            </a:extLst>
+          </p:cNvPr>
+          <p:cNvSpPr txBox="1"/>
+          <p:nvPr/>
+        </p:nvSpPr>
+        <p:spPr>
+          <a:xfrm>
+            <a:off x="1460211" y="5478015"/>
+            <a:ext cx="2842076" cy="430887"/>
+          </a:xfrm>
+          <a:prstGeom prst="rect">
+            <a:avLst/>
+          </a:prstGeom>
+          <a:noFill/>
+        </p:spPr>
+        <p:txBody>
+          <a:bodyPr wrap="square" lIns="0" tIns="0" rIns="0" bIns="0" rtlCol="0">
+            <a:spAutoFit/>
+          </a:bodyPr>
+          <a:lstStyle/>
+          <a:p>
+            <a:r>
+              <a:rPr lang="en-US" sz="1400" dirty="0">
+                <a:solidFill>
+                  <a:schemeClr val="accent5">
+                    <a:lumMod val="75000"/>
+                  </a:schemeClr>
+                </a:solidFill>
+              </a:rPr>
+              <a:t>post(</a:t>
+            </a:r>
+            <a:r>
+              <a:rPr lang="en-US" sz="1400" dirty="0" err="1">
+                <a:solidFill>
+                  <a:schemeClr val="accent5">
+                    <a:lumMod val="75000"/>
+                  </a:schemeClr>
+                </a:solidFill>
+              </a:rPr>
+              <a:t>handleUpdateExpandedEntryEvent</a:t>
+            </a:r>
+            <a:r>
+              <a:rPr lang="en-US" sz="1400" dirty="0">
+                <a:solidFill>
+                  <a:schemeClr val="accent5">
+                    <a:lumMod val="75000"/>
+                  </a:schemeClr>
+                </a:solidFill>
+              </a:rPr>
+              <a:t>)</a:t>
+            </a:r>
+          </a:p>
+        </p:txBody>
+      </p:sp>
+      <p:cxnSp>
+        <p:nvCxnSpPr>
+          <p:cNvPr id="45" name="Straight Arrow Connector 44">
+            <a:extLst>
+              <a:ext uri="{FF2B5EF4-FFF2-40B4-BE49-F238E27FC236}">
+                <a16:creationId xmlns:a16="http://schemas.microsoft.com/office/drawing/2014/main" id="{7FC464F2-B1CC-42CE-8409-E440DD9683CD}"/>
+              </a:ext>
+            </a:extLst>
+          </p:cNvPr>
+          <p:cNvCxnSpPr/>
+          <p:nvPr/>
+        </p:nvCxnSpPr>
+        <p:spPr>
+          <a:xfrm flipH="1">
+            <a:off x="1326721" y="6019800"/>
+            <a:ext cx="3061842" cy="0"/>
+          </a:xfrm>
+          <a:prstGeom prst="straightConnector1">
+            <a:avLst/>
+          </a:prstGeom>
+          <a:ln w="19050">
+            <a:solidFill>
+              <a:srgbClr val="00B050"/>
+            </a:solidFill>
+            <a:prstDash val="sysDash"/>
+            <a:headEnd type="arrow" w="med" len="med"/>
+            <a:tailEnd type="none" w="med" len="med"/>
+          </a:ln>
+        </p:spPr>
+        <p:style>
+          <a:lnRef idx="1">
+            <a:schemeClr val="accent1"/>
+          </a:lnRef>
+          <a:fillRef idx="0">
+            <a:schemeClr val="accent1"/>
+          </a:fillRef>
+          <a:effectRef idx="0">
+            <a:schemeClr val="accent1"/>
+          </a:effectRef>
+          <a:fontRef idx="minor">
+            <a:schemeClr val="tx1"/>
+          </a:fontRef>
+        </p:style>
+      </p:cxnSp>
+      <p:sp>
+        <p:nvSpPr>
+          <p:cNvPr id="48" name="Rectangle 47">
+            <a:extLst>
+              <a:ext uri="{FF2B5EF4-FFF2-40B4-BE49-F238E27FC236}">
+                <a16:creationId xmlns:a16="http://schemas.microsoft.com/office/drawing/2014/main" id="{954420C8-79AD-4B41-B8FB-5341BBB9C6A4}"/>
+              </a:ext>
+            </a:extLst>
+          </p:cNvPr>
+          <p:cNvSpPr/>
+          <p:nvPr/>
+        </p:nvSpPr>
+        <p:spPr>
+          <a:xfrm>
+            <a:off x="1133370" y="5453445"/>
+            <a:ext cx="193351" cy="650585"/>
+          </a:xfrm>
+          <a:prstGeom prst="rect">
+            <a:avLst/>
+          </a:prstGeom>
+          <a:solidFill>
+            <a:srgbClr val="00B050"/>
+          </a:solidFill>
+          <a:ln>
+            <a:solidFill>
+              <a:schemeClr val="bg1"/>
+            </a:solidFill>
+          </a:ln>
+          <a:effectLst/>
+        </p:spPr>
+        <p:style>
+          <a:lnRef idx="1">
+            <a:schemeClr val="accent3"/>
+          </a:lnRef>
+          <a:fillRef idx="2">
+            <a:schemeClr val="accent3"/>
+          </a:fillRef>
+          <a:effectRef idx="1">
+            <a:schemeClr val="accent3"/>
+          </a:effectRef>
+          <a:fontRef idx="minor">
+            <a:schemeClr val="dk1"/>
+          </a:fontRef>
+        </p:style>
+        <p:txBody>
+          <a:bodyPr rtlCol="0" anchor="ctr"/>
+          <a:lstStyle/>
+          <a:p>
+            <a:pPr algn="ctr"/>
+            <a:endParaRPr lang="en-SG" sz="1400">
+              <a:solidFill>
+                <a:schemeClr val="dk1"/>
+              </a:solidFill>
+            </a:endParaRPr>
+          </a:p>
+        </p:txBody>
+      </p:sp>
+      <p:cxnSp>
+        <p:nvCxnSpPr>
+          <p:cNvPr id="49" name="Straight Arrow Connector 48">
+            <a:extLst>
+              <a:ext uri="{FF2B5EF4-FFF2-40B4-BE49-F238E27FC236}">
+                <a16:creationId xmlns:a16="http://schemas.microsoft.com/office/drawing/2014/main" id="{B6749619-662C-4C4D-8E2F-8AC54C7EA17C}"/>
+              </a:ext>
+            </a:extLst>
+          </p:cNvPr>
+          <p:cNvCxnSpPr>
+            <a:cxnSpLocks/>
+          </p:cNvCxnSpPr>
+          <p:nvPr/>
+        </p:nvCxnSpPr>
+        <p:spPr>
+          <a:xfrm>
+            <a:off x="3200400" y="6377818"/>
+            <a:ext cx="1219492" cy="0"/>
+          </a:xfrm>
+          <a:prstGeom prst="straightConnector1">
+            <a:avLst/>
+          </a:prstGeom>
+          <a:ln w="19050">
+            <a:solidFill>
+              <a:schemeClr val="accent5">
+                <a:lumMod val="75000"/>
+              </a:schemeClr>
+            </a:solidFill>
+            <a:prstDash val="sysDash"/>
+            <a:headEnd type="arrow" w="med" len="med"/>
+            <a:tailEnd type="none" w="med" len="med"/>
+          </a:ln>
+        </p:spPr>
+        <p:style>
+          <a:lnRef idx="1">
+            <a:schemeClr val="accent1"/>
+          </a:lnRef>
+          <a:fillRef idx="0">
+            <a:schemeClr val="accent1"/>
+          </a:fillRef>
+          <a:effectRef idx="0">
+            <a:schemeClr val="accent1"/>
+          </a:effectRef>
+          <a:fontRef idx="minor">
+            <a:schemeClr val="tx1"/>
+          </a:fontRef>
+        </p:style>
+      </p:cxnSp>
+      <p:sp>
+        <p:nvSpPr>
+          <p:cNvPr id="50" name="TextBox 49">
+            <a:extLst>
+              <a:ext uri="{FF2B5EF4-FFF2-40B4-BE49-F238E27FC236}">
+                <a16:creationId xmlns:a16="http://schemas.microsoft.com/office/drawing/2014/main" id="{BEFD1BAF-8EAD-44E5-9791-BA32EA1F61A0}"/>
+              </a:ext>
+            </a:extLst>
+          </p:cNvPr>
+          <p:cNvSpPr txBox="1"/>
+          <p:nvPr/>
+        </p:nvSpPr>
+        <p:spPr>
+          <a:xfrm>
+            <a:off x="-76200" y="3980519"/>
+            <a:ext cx="794081" cy="646331"/>
+          </a:xfrm>
+          <a:prstGeom prst="rect">
+            <a:avLst/>
+          </a:prstGeom>
+          <a:noFill/>
+        </p:spPr>
+        <p:txBody>
+          <a:bodyPr wrap="square" lIns="0" tIns="0" rIns="0" bIns="0" rtlCol="0">
+            <a:spAutoFit/>
+          </a:bodyPr>
+          <a:lstStyle/>
+          <a:p>
+            <a:pPr algn="r"/>
+            <a:r>
+              <a:rPr lang="en-US" sz="1400" dirty="0">
+                <a:solidFill>
+                  <a:srgbClr val="00B050"/>
+                </a:solidFill>
+              </a:rPr>
+              <a:t>Update entry list selection</a:t>
+            </a:r>
+          </a:p>
+        </p:txBody>
+      </p:sp>
+      <p:sp>
+        <p:nvSpPr>
+          <p:cNvPr id="51" name="TextBox 50">
+            <a:extLst>
+              <a:ext uri="{FF2B5EF4-FFF2-40B4-BE49-F238E27FC236}">
+                <a16:creationId xmlns:a16="http://schemas.microsoft.com/office/drawing/2014/main" id="{04378204-924E-4CF7-A223-7DF86F4F4B2A}"/>
+              </a:ext>
+            </a:extLst>
+          </p:cNvPr>
+          <p:cNvSpPr txBox="1"/>
+          <p:nvPr/>
+        </p:nvSpPr>
+        <p:spPr>
+          <a:xfrm>
+            <a:off x="-152400" y="5559900"/>
+            <a:ext cx="794081" cy="861774"/>
+          </a:xfrm>
+          <a:prstGeom prst="rect">
+            <a:avLst/>
+          </a:prstGeom>
+          <a:noFill/>
+        </p:spPr>
+        <p:txBody>
+          <a:bodyPr wrap="square" lIns="0" tIns="0" rIns="0" bIns="0" rtlCol="0">
+            <a:spAutoFit/>
+          </a:bodyPr>
+          <a:lstStyle/>
+          <a:p>
+            <a:pPr algn="r"/>
+            <a:r>
+              <a:rPr lang="en-US" sz="1400" dirty="0">
+                <a:solidFill>
+                  <a:srgbClr val="00B050"/>
+                </a:solidFill>
+              </a:rPr>
+              <a:t>Update expanded entry panel</a:t>
+            </a:r>
+          </a:p>
+        </p:txBody>
+      </p:sp>
+      <p:sp>
+        <p:nvSpPr>
+          <p:cNvPr id="52" name="Rectangle 51">
+            <a:extLst>
+              <a:ext uri="{FF2B5EF4-FFF2-40B4-BE49-F238E27FC236}">
+                <a16:creationId xmlns:a16="http://schemas.microsoft.com/office/drawing/2014/main" id="{0B5D84B4-688A-40CC-A24C-015A975EAA49}"/>
+              </a:ext>
+            </a:extLst>
+          </p:cNvPr>
+          <p:cNvSpPr/>
+          <p:nvPr/>
+        </p:nvSpPr>
+        <p:spPr>
+          <a:xfrm>
+            <a:off x="4355975" y="3478792"/>
+            <a:ext cx="116452" cy="1148058"/>
+          </a:xfrm>
+          <a:prstGeom prst="rect">
+            <a:avLst/>
+          </a:prstGeom>
+          <a:solidFill>
+            <a:schemeClr val="accent5">
+              <a:lumMod val="75000"/>
+            </a:schemeClr>
+          </a:solidFill>
+          <a:ln>
+            <a:solidFill>
+              <a:schemeClr val="accent5">
+                <a:lumMod val="75000"/>
+              </a:schemeClr>
+            </a:solidFill>
+          </a:ln>
+          <a:effectLst/>
+        </p:spPr>
+        <p:style>
+          <a:lnRef idx="1">
+            <a:schemeClr val="accent3"/>
+          </a:lnRef>
+          <a:fillRef idx="2">
+            <a:schemeClr val="accent3"/>
+          </a:fillRef>
+          <a:effectRef idx="1">
+            <a:schemeClr val="accent3"/>
+          </a:effectRef>
+          <a:fontRef idx="minor">
+            <a:schemeClr val="dk1"/>
+          </a:fontRef>
+        </p:style>
+        <p:txBody>
+          <a:bodyPr rtlCol="0" anchor="ctr"/>
+          <a:lstStyle/>
+          <a:p>
+            <a:pPr algn="ctr"/>
+            <a:endParaRPr lang="en-SG" sz="1400">
+              <a:solidFill>
+                <a:schemeClr val="dk1"/>
+              </a:solidFill>
+            </a:endParaRPr>
+          </a:p>
+        </p:txBody>
+      </p:sp>
+      <p:sp>
+        <p:nvSpPr>
+          <p:cNvPr id="53" name="Rectangle 52">
+            <a:extLst>
+              <a:ext uri="{FF2B5EF4-FFF2-40B4-BE49-F238E27FC236}">
+                <a16:creationId xmlns:a16="http://schemas.microsoft.com/office/drawing/2014/main" id="{5F7F0D89-0E77-40A4-A74D-FCE36C0EEBC6}"/>
+              </a:ext>
+            </a:extLst>
+          </p:cNvPr>
+          <p:cNvSpPr/>
+          <p:nvPr/>
+        </p:nvSpPr>
+        <p:spPr>
+          <a:xfrm>
+            <a:off x="4371744" y="5325703"/>
+            <a:ext cx="106373" cy="1052115"/>
+          </a:xfrm>
+          <a:prstGeom prst="rect">
+            <a:avLst/>
+          </a:prstGeom>
+          <a:solidFill>
+            <a:schemeClr val="accent5">
+              <a:lumMod val="75000"/>
+            </a:schemeClr>
+          </a:solidFill>
+          <a:ln>
+            <a:solidFill>
+              <a:schemeClr val="accent5">
+                <a:lumMod val="75000"/>
+              </a:schemeClr>
+            </a:solidFill>
+          </a:ln>
+          <a:effectLst/>
+        </p:spPr>
+        <p:style>
+          <a:lnRef idx="1">
+            <a:schemeClr val="accent3"/>
+          </a:lnRef>
+          <a:fillRef idx="2">
+            <a:schemeClr val="accent3"/>
+          </a:fillRef>
+          <a:effectRef idx="1">
+            <a:schemeClr val="accent3"/>
+          </a:effectRef>
+          <a:fontRef idx="minor">
+            <a:schemeClr val="dk1"/>
+          </a:fontRef>
+        </p:style>
+        <p:txBody>
+          <a:bodyPr rtlCol="0" anchor="ctr"/>
+          <a:lstStyle/>
+          <a:p>
+            <a:pPr algn="ctr"/>
+            <a:endParaRPr lang="en-SG" sz="1400">
+              <a:solidFill>
+                <a:schemeClr val="dk1"/>
+              </a:solidFill>
+            </a:endParaRPr>
+          </a:p>
+        </p:txBody>
+      </p:sp>
       <p:grpSp>
         <p:nvGrpSpPr>
-          <p:cNvPr id="34" name="Group 33">
+          <p:cNvPr id="58" name="Group 57">
             <a:extLst>
               <a:ext uri="{FF2B5EF4-FFF2-40B4-BE49-F238E27FC236}">
-                <a16:creationId xmlns:a16="http://schemas.microsoft.com/office/drawing/2014/main" id="{5DC6EFA2-CD9A-44F8-BE73-C8DDBAB32184}"/>
+                <a16:creationId xmlns:a16="http://schemas.microsoft.com/office/drawing/2014/main" id="{54AB9822-F0DE-4557-A92E-2199429257FE}"/>
               </a:ext>
             </a:extLst>
           </p:cNvPr>
@@ -13062,18 +13764,18 @@
         </p:nvGrpSpPr>
         <p:grpSpPr>
           <a:xfrm>
-            <a:off x="910853" y="3772703"/>
-            <a:ext cx="289176" cy="646897"/>
-            <a:chOff x="1028134" y="5612032"/>
-            <a:chExt cx="217349" cy="270072"/>
+            <a:off x="969436" y="3836312"/>
+            <a:ext cx="249764" cy="430888"/>
+            <a:chOff x="1072933" y="5504925"/>
+            <a:chExt cx="143421" cy="377179"/>
           </a:xfrm>
         </p:grpSpPr>
         <p:sp>
           <p:nvSpPr>
-            <p:cNvPr id="35" name="Freeform 11">
+            <p:cNvPr id="59" name="Freeform 11">
               <a:extLst>
                 <a:ext uri="{FF2B5EF4-FFF2-40B4-BE49-F238E27FC236}">
-                  <a16:creationId xmlns:a16="http://schemas.microsoft.com/office/drawing/2014/main" id="{1614D29D-8D00-4D14-A83F-C6AFB8458766}"/>
+                  <a16:creationId xmlns:a16="http://schemas.microsoft.com/office/drawing/2014/main" id="{A680101C-FFD8-4565-A3CE-5C8CF43D4BEA}"/>
                 </a:ext>
               </a:extLst>
             </p:cNvPr>
@@ -13082,8 +13784,8 @@
           </p:nvSpPr>
           <p:spPr>
             <a:xfrm rot="2600998" flipH="1" flipV="1">
-              <a:off x="1028134" y="5612032"/>
-              <a:ext cx="167452" cy="116880"/>
+              <a:off x="1072933" y="5504925"/>
+              <a:ext cx="106856" cy="155049"/>
             </a:xfrm>
             <a:custGeom>
               <a:avLst/>
@@ -13169,10 +13871,10 @@
         </p:sp>
         <p:sp>
           <p:nvSpPr>
-            <p:cNvPr id="36" name="Rectangle 35">
+            <p:cNvPr id="60" name="Rectangle 59">
               <a:extLst>
                 <a:ext uri="{FF2B5EF4-FFF2-40B4-BE49-F238E27FC236}">
-                  <a16:creationId xmlns:a16="http://schemas.microsoft.com/office/drawing/2014/main" id="{C6037FFC-F444-4533-BE7E-AEEDBB2A0E4F}"/>
+                  <a16:creationId xmlns:a16="http://schemas.microsoft.com/office/drawing/2014/main" id="{CA259494-0021-40A7-AA9B-CE329DAD8977}"/>
                 </a:ext>
               </a:extLst>
             </p:cNvPr>
@@ -13181,8 +13883,8 @@
           </p:nvSpPr>
           <p:spPr>
             <a:xfrm>
-              <a:off x="1147403" y="5712513"/>
-              <a:ext cx="98080" cy="169591"/>
+              <a:off x="1147404" y="5660838"/>
+              <a:ext cx="68950" cy="221266"/>
             </a:xfrm>
             <a:prstGeom prst="rect">
               <a:avLst/>
@@ -13216,7 +13918,7 @@
             <a:lstStyle/>
             <a:p>
               <a:pPr algn="ctr"/>
-              <a:endParaRPr lang="en-SG" sz="1400">
+              <a:endParaRPr lang="en-SG" sz="1400" dirty="0">
                 <a:solidFill>
                   <a:schemeClr val="dk1"/>
                 </a:solidFill>
@@ -13225,350 +13927,12 @@
           </p:txBody>
         </p:sp>
       </p:grpSp>
-      <p:sp>
-        <p:nvSpPr>
-          <p:cNvPr id="37" name="Rectangle 36">
+      <p:grpSp>
+        <p:nvGrpSpPr>
+          <p:cNvPr id="61" name="Group 60">
             <a:extLst>
               <a:ext uri="{FF2B5EF4-FFF2-40B4-BE49-F238E27FC236}">
-                <a16:creationId xmlns:a16="http://schemas.microsoft.com/office/drawing/2014/main" id="{8B8F83CC-2517-410B-8442-FE0FD2BE10AC}"/>
-              </a:ext>
-            </a:extLst>
-          </p:cNvPr>
-          <p:cNvSpPr/>
-          <p:nvPr/>
-        </p:nvSpPr>
-        <p:spPr>
-          <a:xfrm>
-            <a:off x="1316598" y="3937034"/>
-            <a:ext cx="2985689" cy="307777"/>
-          </a:xfrm>
-          <a:prstGeom prst="rect">
-            <a:avLst/>
-          </a:prstGeom>
-        </p:spPr>
-        <p:txBody>
-          <a:bodyPr wrap="none">
-            <a:spAutoFit/>
-          </a:bodyPr>
-          <a:lstStyle/>
-          <a:p>
-            <a:r>
-              <a:rPr lang="en-US" sz="1400" dirty="0" err="1">
-                <a:solidFill>
-                  <a:srgbClr val="00B050"/>
-                </a:solidFill>
-              </a:rPr>
-              <a:t>handleJumpToEntryListRequestEvent</a:t>
-            </a:r>
-            <a:r>
-              <a:rPr lang="en-US" sz="1400" dirty="0">
-                <a:solidFill>
-                  <a:srgbClr val="00B050"/>
-                </a:solidFill>
-              </a:rPr>
-              <a:t>()</a:t>
-            </a:r>
-            <a:endParaRPr lang="en-SG" sz="1400" dirty="0">
-              <a:solidFill>
-                <a:srgbClr val="00B050"/>
-              </a:solidFill>
-            </a:endParaRPr>
-          </a:p>
-        </p:txBody>
-      </p:sp>
-      <p:cxnSp>
-        <p:nvCxnSpPr>
-          <p:cNvPr id="39" name="Straight Arrow Connector 38">
-            <a:extLst>
-              <a:ext uri="{FF2B5EF4-FFF2-40B4-BE49-F238E27FC236}">
-                <a16:creationId xmlns:a16="http://schemas.microsoft.com/office/drawing/2014/main" id="{5FBCDF11-5279-4A51-AEB4-68D702874CB4}"/>
-              </a:ext>
-            </a:extLst>
-          </p:cNvPr>
-          <p:cNvCxnSpPr/>
-          <p:nvPr/>
-        </p:nvCxnSpPr>
-        <p:spPr>
-          <a:xfrm>
-            <a:off x="1313009" y="3927104"/>
-            <a:ext cx="3061841" cy="0"/>
-          </a:xfrm>
-          <a:prstGeom prst="straightConnector1">
-            <a:avLst/>
-          </a:prstGeom>
-          <a:ln w="19050">
-            <a:solidFill>
-              <a:schemeClr val="accent5">
-                <a:lumMod val="75000"/>
-              </a:schemeClr>
-            </a:solidFill>
-            <a:headEnd type="arrow" w="med" len="med"/>
-            <a:tailEnd type="none" w="med" len="med"/>
-          </a:ln>
-        </p:spPr>
-        <p:style>
-          <a:lnRef idx="1">
-            <a:schemeClr val="accent1"/>
-          </a:lnRef>
-          <a:fillRef idx="0">
-            <a:schemeClr val="accent1"/>
-          </a:fillRef>
-          <a:effectRef idx="0">
-            <a:schemeClr val="accent1"/>
-          </a:effectRef>
-          <a:fontRef idx="minor">
-            <a:schemeClr val="tx1"/>
-          </a:fontRef>
-        </p:style>
-      </p:cxnSp>
-      <p:cxnSp>
-        <p:nvCxnSpPr>
-          <p:cNvPr id="40" name="Straight Arrow Connector 39">
-            <a:extLst>
-              <a:ext uri="{FF2B5EF4-FFF2-40B4-BE49-F238E27FC236}">
-                <a16:creationId xmlns:a16="http://schemas.microsoft.com/office/drawing/2014/main" id="{745CA873-4836-460C-AEDD-811AD2FDBB5C}"/>
-              </a:ext>
-            </a:extLst>
-          </p:cNvPr>
-          <p:cNvCxnSpPr/>
-          <p:nvPr/>
-        </p:nvCxnSpPr>
-        <p:spPr>
-          <a:xfrm flipH="1">
-            <a:off x="1287607" y="4419600"/>
-            <a:ext cx="3061842" cy="0"/>
-          </a:xfrm>
-          <a:prstGeom prst="straightConnector1">
-            <a:avLst/>
-          </a:prstGeom>
-          <a:ln w="19050">
-            <a:solidFill>
-              <a:srgbClr val="00B050"/>
-            </a:solidFill>
-            <a:prstDash val="sysDash"/>
-            <a:headEnd type="arrow" w="med" len="med"/>
-            <a:tailEnd type="none" w="med" len="med"/>
-          </a:ln>
-        </p:spPr>
-        <p:style>
-          <a:lnRef idx="1">
-            <a:schemeClr val="accent1"/>
-          </a:lnRef>
-          <a:fillRef idx="0">
-            <a:schemeClr val="accent1"/>
-          </a:fillRef>
-          <a:effectRef idx="0">
-            <a:schemeClr val="accent1"/>
-          </a:effectRef>
-          <a:fontRef idx="minor">
-            <a:schemeClr val="tx1"/>
-          </a:fontRef>
-        </p:style>
-      </p:cxnSp>
-      <p:cxnSp>
-        <p:nvCxnSpPr>
-          <p:cNvPr id="41" name="Straight Arrow Connector 40">
-            <a:extLst>
-              <a:ext uri="{FF2B5EF4-FFF2-40B4-BE49-F238E27FC236}">
-                <a16:creationId xmlns:a16="http://schemas.microsoft.com/office/drawing/2014/main" id="{40B56870-0E82-40C5-A9A0-22069B184D96}"/>
-              </a:ext>
-            </a:extLst>
-          </p:cNvPr>
-          <p:cNvCxnSpPr>
-            <a:cxnSpLocks/>
-          </p:cNvCxnSpPr>
-          <p:nvPr/>
-        </p:nvCxnSpPr>
-        <p:spPr>
-          <a:xfrm>
-            <a:off x="3060575" y="4648200"/>
-            <a:ext cx="1327988" cy="0"/>
-          </a:xfrm>
-          <a:prstGeom prst="straightConnector1">
-            <a:avLst/>
-          </a:prstGeom>
-          <a:ln w="19050">
-            <a:solidFill>
-              <a:schemeClr val="accent5">
-                <a:lumMod val="75000"/>
-              </a:schemeClr>
-            </a:solidFill>
-            <a:prstDash val="sysDash"/>
-            <a:headEnd type="arrow" w="med" len="med"/>
-            <a:tailEnd type="none" w="med" len="med"/>
-          </a:ln>
-        </p:spPr>
-        <p:style>
-          <a:lnRef idx="1">
-            <a:schemeClr val="accent1"/>
-          </a:lnRef>
-          <a:fillRef idx="0">
-            <a:schemeClr val="accent1"/>
-          </a:fillRef>
-          <a:effectRef idx="0">
-            <a:schemeClr val="accent1"/>
-          </a:effectRef>
-          <a:fontRef idx="minor">
-            <a:schemeClr val="tx1"/>
-          </a:fontRef>
-        </p:style>
-      </p:cxnSp>
-      <p:cxnSp>
-        <p:nvCxnSpPr>
-          <p:cNvPr id="42" name="Straight Arrow Connector 41">
-            <a:extLst>
-              <a:ext uri="{FF2B5EF4-FFF2-40B4-BE49-F238E27FC236}">
-                <a16:creationId xmlns:a16="http://schemas.microsoft.com/office/drawing/2014/main" id="{E9F74C9C-1941-4E92-9EA9-F7D49C40551E}"/>
-              </a:ext>
-            </a:extLst>
-          </p:cNvPr>
-          <p:cNvCxnSpPr/>
-          <p:nvPr/>
-        </p:nvCxnSpPr>
-        <p:spPr>
-          <a:xfrm>
-            <a:off x="1240446" y="5410452"/>
-            <a:ext cx="3061841" cy="0"/>
-          </a:xfrm>
-          <a:prstGeom prst="straightConnector1">
-            <a:avLst/>
-          </a:prstGeom>
-          <a:ln w="19050">
-            <a:solidFill>
-              <a:schemeClr val="accent5">
-                <a:lumMod val="75000"/>
-              </a:schemeClr>
-            </a:solidFill>
-            <a:headEnd type="arrow" w="med" len="med"/>
-            <a:tailEnd type="none" w="med" len="med"/>
-          </a:ln>
-        </p:spPr>
-        <p:style>
-          <a:lnRef idx="1">
-            <a:schemeClr val="accent1"/>
-          </a:lnRef>
-          <a:fillRef idx="0">
-            <a:schemeClr val="accent1"/>
-          </a:fillRef>
-          <a:effectRef idx="0">
-            <a:schemeClr val="accent1"/>
-          </a:effectRef>
-          <a:fontRef idx="minor">
-            <a:schemeClr val="tx1"/>
-          </a:fontRef>
-        </p:style>
-      </p:cxnSp>
-      <p:sp>
-        <p:nvSpPr>
-          <p:cNvPr id="44" name="TextBox 43">
-            <a:extLst>
-              <a:ext uri="{FF2B5EF4-FFF2-40B4-BE49-F238E27FC236}">
-                <a16:creationId xmlns:a16="http://schemas.microsoft.com/office/drawing/2014/main" id="{6BC43812-C598-4B2B-855B-C59FD1B57057}"/>
-              </a:ext>
-            </a:extLst>
-          </p:cNvPr>
-          <p:cNvSpPr txBox="1"/>
-          <p:nvPr/>
-        </p:nvSpPr>
-        <p:spPr>
-          <a:xfrm>
-            <a:off x="1460211" y="5478015"/>
-            <a:ext cx="2842076" cy="430887"/>
-          </a:xfrm>
-          <a:prstGeom prst="rect">
-            <a:avLst/>
-          </a:prstGeom>
-          <a:noFill/>
-        </p:spPr>
-        <p:txBody>
-          <a:bodyPr wrap="square" lIns="0" tIns="0" rIns="0" bIns="0" rtlCol="0">
-            <a:spAutoFit/>
-          </a:bodyPr>
-          <a:lstStyle/>
-          <a:p>
-            <a:r>
-              <a:rPr lang="en-US" sz="1400" dirty="0">
-                <a:solidFill>
-                  <a:schemeClr val="accent5">
-                    <a:lumMod val="75000"/>
-                  </a:schemeClr>
-                </a:solidFill>
-              </a:rPr>
-              <a:t>post(</a:t>
-            </a:r>
-            <a:r>
-              <a:rPr lang="en-US" sz="1400" dirty="0" err="1">
-                <a:solidFill>
-                  <a:schemeClr val="accent5">
-                    <a:lumMod val="75000"/>
-                  </a:schemeClr>
-                </a:solidFill>
-              </a:rPr>
-              <a:t>handleUpdateExpandedEntryEvent</a:t>
-            </a:r>
-            <a:r>
-              <a:rPr lang="en-US" sz="1400" dirty="0">
-                <a:solidFill>
-                  <a:schemeClr val="accent5">
-                    <a:lumMod val="75000"/>
-                  </a:schemeClr>
-                </a:solidFill>
-              </a:rPr>
-              <a:t>)</a:t>
-            </a:r>
-          </a:p>
-        </p:txBody>
-      </p:sp>
-      <p:cxnSp>
-        <p:nvCxnSpPr>
-          <p:cNvPr id="45" name="Straight Arrow Connector 44">
-            <a:extLst>
-              <a:ext uri="{FF2B5EF4-FFF2-40B4-BE49-F238E27FC236}">
-                <a16:creationId xmlns:a16="http://schemas.microsoft.com/office/drawing/2014/main" id="{7FC464F2-B1CC-42CE-8409-E440DD9683CD}"/>
-              </a:ext>
-            </a:extLst>
-          </p:cNvPr>
-          <p:cNvCxnSpPr/>
-          <p:nvPr/>
-        </p:nvCxnSpPr>
-        <p:spPr>
-          <a:xfrm flipH="1">
-            <a:off x="1326721" y="6019800"/>
-            <a:ext cx="3061842" cy="0"/>
-          </a:xfrm>
-          <a:prstGeom prst="straightConnector1">
-            <a:avLst/>
-          </a:prstGeom>
-          <a:ln w="19050">
-            <a:solidFill>
-              <a:srgbClr val="00B050"/>
-            </a:solidFill>
-            <a:prstDash val="sysDash"/>
-            <a:headEnd type="arrow" w="med" len="med"/>
-            <a:tailEnd type="none" w="med" len="med"/>
-          </a:ln>
-        </p:spPr>
-        <p:style>
-          <a:lnRef idx="1">
-            <a:schemeClr val="accent1"/>
-          </a:lnRef>
-          <a:fillRef idx="0">
-            <a:schemeClr val="accent1"/>
-          </a:fillRef>
-          <a:effectRef idx="0">
-            <a:schemeClr val="accent1"/>
-          </a:effectRef>
-          <a:fontRef idx="minor">
-            <a:schemeClr val="tx1"/>
-          </a:fontRef>
-        </p:style>
-      </p:cxnSp>
-      <p:grpSp>
-        <p:nvGrpSpPr>
-          <p:cNvPr id="46" name="Group 45">
-            <a:extLst>
-              <a:ext uri="{FF2B5EF4-FFF2-40B4-BE49-F238E27FC236}">
-                <a16:creationId xmlns:a16="http://schemas.microsoft.com/office/drawing/2014/main" id="{EB0F53D9-2EC9-4FC3-A6A2-0208DF4964FE}"/>
+                <a16:creationId xmlns:a16="http://schemas.microsoft.com/office/drawing/2014/main" id="{2B4BE77C-FAA3-4FCD-A0C6-5FE872AA11E7}"/>
               </a:ext>
             </a:extLst>
           </p:cNvPr>
@@ -13577,18 +13941,18 @@
         </p:nvGrpSpPr>
         <p:grpSpPr>
           <a:xfrm>
-            <a:off x="900674" y="5242266"/>
-            <a:ext cx="268783" cy="861774"/>
-            <a:chOff x="1028134" y="5612032"/>
-            <a:chExt cx="217349" cy="270072"/>
+            <a:off x="969436" y="5436512"/>
+            <a:ext cx="249764" cy="430888"/>
+            <a:chOff x="1072933" y="5504925"/>
+            <a:chExt cx="143421" cy="377179"/>
           </a:xfrm>
         </p:grpSpPr>
         <p:sp>
           <p:nvSpPr>
-            <p:cNvPr id="47" name="Freeform 11">
+            <p:cNvPr id="62" name="Freeform 11">
               <a:extLst>
                 <a:ext uri="{FF2B5EF4-FFF2-40B4-BE49-F238E27FC236}">
-                  <a16:creationId xmlns:a16="http://schemas.microsoft.com/office/drawing/2014/main" id="{632877B4-F460-48BB-BC35-68DF5CC1C6C6}"/>
+                  <a16:creationId xmlns:a16="http://schemas.microsoft.com/office/drawing/2014/main" id="{574182E3-3818-4941-A1B6-0A0F8FC51A4F}"/>
                 </a:ext>
               </a:extLst>
             </p:cNvPr>
@@ -13597,8 +13961,8 @@
           </p:nvSpPr>
           <p:spPr>
             <a:xfrm rot="2600998" flipH="1" flipV="1">
-              <a:off x="1028134" y="5612032"/>
-              <a:ext cx="167452" cy="116880"/>
+              <a:off x="1072933" y="5504925"/>
+              <a:ext cx="106856" cy="155049"/>
             </a:xfrm>
             <a:custGeom>
               <a:avLst/>
@@ -13684,10 +14048,10 @@
         </p:sp>
         <p:sp>
           <p:nvSpPr>
-            <p:cNvPr id="48" name="Rectangle 47">
+            <p:cNvPr id="63" name="Rectangle 62">
               <a:extLst>
                 <a:ext uri="{FF2B5EF4-FFF2-40B4-BE49-F238E27FC236}">
-                  <a16:creationId xmlns:a16="http://schemas.microsoft.com/office/drawing/2014/main" id="{954420C8-79AD-4B41-B8FB-5341BBB9C6A4}"/>
+                  <a16:creationId xmlns:a16="http://schemas.microsoft.com/office/drawing/2014/main" id="{F90F275A-FC2A-41B7-A6AD-C385085436EA}"/>
                 </a:ext>
               </a:extLst>
             </p:cNvPr>
@@ -13696,8 +14060,8 @@
           </p:nvSpPr>
           <p:spPr>
             <a:xfrm>
-              <a:off x="1147403" y="5712513"/>
-              <a:ext cx="98080" cy="169591"/>
+              <a:off x="1147404" y="5660838"/>
+              <a:ext cx="68950" cy="221266"/>
             </a:xfrm>
             <a:prstGeom prst="rect">
               <a:avLst/>
@@ -13731,7 +14095,7 @@
             <a:lstStyle/>
             <a:p>
               <a:pPr algn="ctr"/>
-              <a:endParaRPr lang="en-SG" sz="1400">
+              <a:endParaRPr lang="en-SG" sz="1400" dirty="0">
                 <a:solidFill>
                   <a:schemeClr val="dk1"/>
                 </a:solidFill>
@@ -13740,256 +14104,6 @@
           </p:txBody>
         </p:sp>
       </p:grpSp>
-      <p:cxnSp>
-        <p:nvCxnSpPr>
-          <p:cNvPr id="49" name="Straight Arrow Connector 48">
-            <a:extLst>
-              <a:ext uri="{FF2B5EF4-FFF2-40B4-BE49-F238E27FC236}">
-                <a16:creationId xmlns:a16="http://schemas.microsoft.com/office/drawing/2014/main" id="{B6749619-662C-4C4D-8E2F-8AC54C7EA17C}"/>
-              </a:ext>
-            </a:extLst>
-          </p:cNvPr>
-          <p:cNvCxnSpPr>
-            <a:cxnSpLocks/>
-          </p:cNvCxnSpPr>
-          <p:nvPr/>
-        </p:nvCxnSpPr>
-        <p:spPr>
-          <a:xfrm>
-            <a:off x="3200400" y="6377818"/>
-            <a:ext cx="1219492" cy="0"/>
-          </a:xfrm>
-          <a:prstGeom prst="straightConnector1">
-            <a:avLst/>
-          </a:prstGeom>
-          <a:ln w="19050">
-            <a:solidFill>
-              <a:schemeClr val="accent5">
-                <a:lumMod val="75000"/>
-              </a:schemeClr>
-            </a:solidFill>
-            <a:prstDash val="sysDash"/>
-            <a:headEnd type="arrow" w="med" len="med"/>
-            <a:tailEnd type="none" w="med" len="med"/>
-          </a:ln>
-        </p:spPr>
-        <p:style>
-          <a:lnRef idx="1">
-            <a:schemeClr val="accent1"/>
-          </a:lnRef>
-          <a:fillRef idx="0">
-            <a:schemeClr val="accent1"/>
-          </a:fillRef>
-          <a:effectRef idx="0">
-            <a:schemeClr val="accent1"/>
-          </a:effectRef>
-          <a:fontRef idx="minor">
-            <a:schemeClr val="tx1"/>
-          </a:fontRef>
-        </p:style>
-      </p:cxnSp>
-      <p:sp>
-        <p:nvSpPr>
-          <p:cNvPr id="50" name="TextBox 49">
-            <a:extLst>
-              <a:ext uri="{FF2B5EF4-FFF2-40B4-BE49-F238E27FC236}">
-                <a16:creationId xmlns:a16="http://schemas.microsoft.com/office/drawing/2014/main" id="{BEFD1BAF-8EAD-44E5-9791-BA32EA1F61A0}"/>
-              </a:ext>
-            </a:extLst>
-          </p:cNvPr>
-          <p:cNvSpPr txBox="1"/>
-          <p:nvPr/>
-        </p:nvSpPr>
-        <p:spPr>
-          <a:xfrm>
-            <a:off x="106593" y="3980519"/>
-            <a:ext cx="794081" cy="646331"/>
-          </a:xfrm>
-          <a:prstGeom prst="rect">
-            <a:avLst/>
-          </a:prstGeom>
-          <a:noFill/>
-        </p:spPr>
-        <p:txBody>
-          <a:bodyPr wrap="square" lIns="0" tIns="0" rIns="0" bIns="0" rtlCol="0">
-            <a:spAutoFit/>
-          </a:bodyPr>
-          <a:lstStyle/>
-          <a:p>
-            <a:pPr algn="r"/>
-            <a:r>
-              <a:rPr lang="en-US" sz="1400" dirty="0">
-                <a:solidFill>
-                  <a:srgbClr val="00B050"/>
-                </a:solidFill>
-              </a:rPr>
-              <a:t>Update entry list selection</a:t>
-            </a:r>
-          </a:p>
-        </p:txBody>
-      </p:sp>
-      <p:sp>
-        <p:nvSpPr>
-          <p:cNvPr id="51" name="TextBox 50">
-            <a:extLst>
-              <a:ext uri="{FF2B5EF4-FFF2-40B4-BE49-F238E27FC236}">
-                <a16:creationId xmlns:a16="http://schemas.microsoft.com/office/drawing/2014/main" id="{04378204-924E-4CF7-A223-7DF86F4F4B2A}"/>
-              </a:ext>
-            </a:extLst>
-          </p:cNvPr>
-          <p:cNvSpPr txBox="1"/>
-          <p:nvPr/>
-        </p:nvSpPr>
-        <p:spPr>
-          <a:xfrm>
-            <a:off x="65279" y="5559900"/>
-            <a:ext cx="794081" cy="861774"/>
-          </a:xfrm>
-          <a:prstGeom prst="rect">
-            <a:avLst/>
-          </a:prstGeom>
-          <a:noFill/>
-        </p:spPr>
-        <p:txBody>
-          <a:bodyPr wrap="square" lIns="0" tIns="0" rIns="0" bIns="0" rtlCol="0">
-            <a:spAutoFit/>
-          </a:bodyPr>
-          <a:lstStyle/>
-          <a:p>
-            <a:pPr algn="r"/>
-            <a:r>
-              <a:rPr lang="en-US" sz="1400" dirty="0">
-                <a:solidFill>
-                  <a:srgbClr val="00B050"/>
-                </a:solidFill>
-              </a:rPr>
-              <a:t>Update expanded entry panel</a:t>
-            </a:r>
-          </a:p>
-        </p:txBody>
-      </p:sp>
-      <p:sp>
-        <p:nvSpPr>
-          <p:cNvPr id="52" name="Rectangle 51">
-            <a:extLst>
-              <a:ext uri="{FF2B5EF4-FFF2-40B4-BE49-F238E27FC236}">
-                <a16:creationId xmlns:a16="http://schemas.microsoft.com/office/drawing/2014/main" id="{0B5D84B4-688A-40CC-A24C-015A975EAA49}"/>
-              </a:ext>
-            </a:extLst>
-          </p:cNvPr>
-          <p:cNvSpPr/>
-          <p:nvPr/>
-        </p:nvSpPr>
-        <p:spPr>
-          <a:xfrm>
-            <a:off x="4355975" y="3478792"/>
-            <a:ext cx="116452" cy="1148058"/>
-          </a:xfrm>
-          <a:prstGeom prst="rect">
-            <a:avLst/>
-          </a:prstGeom>
-          <a:solidFill>
-            <a:schemeClr val="accent5">
-              <a:lumMod val="75000"/>
-            </a:schemeClr>
-          </a:solidFill>
-          <a:ln>
-            <a:solidFill>
-              <a:schemeClr val="accent5">
-                <a:lumMod val="75000"/>
-              </a:schemeClr>
-            </a:solidFill>
-          </a:ln>
-          <a:effectLst/>
-        </p:spPr>
-        <p:style>
-          <a:lnRef idx="1">
-            <a:schemeClr val="accent3"/>
-          </a:lnRef>
-          <a:fillRef idx="2">
-            <a:schemeClr val="accent3"/>
-          </a:fillRef>
-          <a:effectRef idx="1">
-            <a:schemeClr val="accent3"/>
-          </a:effectRef>
-          <a:fontRef idx="minor">
-            <a:schemeClr val="dk1"/>
-          </a:fontRef>
-        </p:style>
-        <p:txBody>
-          <a:bodyPr rtlCol="0" anchor="ctr"/>
-          <a:lstStyle/>
-          <a:p>
-            <a:pPr algn="ctr"/>
-            <a:endParaRPr lang="en-SG" sz="1400">
-              <a:solidFill>
-                <a:schemeClr val="dk1"/>
-              </a:solidFill>
-            </a:endParaRPr>
-          </a:p>
-        </p:txBody>
-      </p:sp>
-      <p:sp>
-        <p:nvSpPr>
-          <p:cNvPr id="53" name="Rectangle 52">
-            <a:extLst>
-              <a:ext uri="{FF2B5EF4-FFF2-40B4-BE49-F238E27FC236}">
-                <a16:creationId xmlns:a16="http://schemas.microsoft.com/office/drawing/2014/main" id="{5F7F0D89-0E77-40A4-A74D-FCE36C0EEBC6}"/>
-              </a:ext>
-            </a:extLst>
-          </p:cNvPr>
-          <p:cNvSpPr/>
-          <p:nvPr/>
-        </p:nvSpPr>
-        <p:spPr>
-          <a:xfrm>
-            <a:off x="4371744" y="5325703"/>
-            <a:ext cx="106373" cy="1052115"/>
-          </a:xfrm>
-          <a:prstGeom prst="rect">
-            <a:avLst/>
-          </a:prstGeom>
-          <a:solidFill>
-            <a:schemeClr val="accent5">
-              <a:lumMod val="75000"/>
-            </a:schemeClr>
-          </a:solidFill>
-          <a:ln>
-            <a:solidFill>
-              <a:schemeClr val="accent5">
-                <a:lumMod val="75000"/>
-              </a:schemeClr>
-            </a:solidFill>
-          </a:ln>
-          <a:effectLst/>
-        </p:spPr>
-        <p:style>
-          <a:lnRef idx="1">
-            <a:schemeClr val="accent3"/>
-          </a:lnRef>
-          <a:fillRef idx="2">
-            <a:schemeClr val="accent3"/>
-          </a:fillRef>
-          <a:effectRef idx="1">
-            <a:schemeClr val="accent3"/>
-          </a:effectRef>
-          <a:fontRef idx="minor">
-            <a:schemeClr val="dk1"/>
-          </a:fontRef>
-        </p:style>
-        <p:txBody>
-          <a:bodyPr rtlCol="0" anchor="ctr"/>
-          <a:lstStyle/>
-          <a:p>
-            <a:pPr algn="ctr"/>
-            <a:endParaRPr lang="en-SG" sz="1400">
-              <a:solidFill>
-                <a:schemeClr val="dk1"/>
-              </a:solidFill>
-            </a:endParaRPr>
-          </a:p>
-        </p:txBody>
-      </p:sp>
     </p:spTree>
     <p:extLst>
       <p:ext uri="{BB962C8B-B14F-4D97-AF65-F5344CB8AC3E}">

</xml_diff>